<commit_message>
Updated version (comments, posters): 14.06.19
</commit_message>
<xml_diff>
--- a/com/program/sponsor_ads/Frelo_Anzeige_Konferenz.pptx
+++ b/com/program/sponsor_ads/Frelo_Anzeige_Konferenz.pptx
@@ -106,7 +106,7 @@
   </p:defaultTextStyle>
   <p:extLst>
     <p:ext uri="{EFAFB233-063F-42B5-8137-9DF3F51BA10A}">
-      <p15:sldGuideLst xmlns:p15="http://schemas.microsoft.com/office/powerpoint/2012/main" xmlns=""/>
+      <p15:sldGuideLst xmlns="" xmlns:p15="http://schemas.microsoft.com/office/powerpoint/2012/main"/>
     </p:ext>
   </p:extLst>
 </p:presentation>
@@ -243,7 +243,7 @@
           <a:p>
             <a:fld id="{647F39AA-F245-48BE-BB30-6F1FA3570527}" type="datetimeFigureOut">
               <a:rPr lang="de-DE" smtClean="0"/>
-              <a:t>06.06.19</a:t>
+              <a:t>14.06.19</a:t>
             </a:fld>
             <a:endParaRPr lang="de-DE"/>
           </a:p>
@@ -413,7 +413,7 @@
           <a:p>
             <a:fld id="{647F39AA-F245-48BE-BB30-6F1FA3570527}" type="datetimeFigureOut">
               <a:rPr lang="de-DE" smtClean="0"/>
-              <a:t>06.06.19</a:t>
+              <a:t>14.06.19</a:t>
             </a:fld>
             <a:endParaRPr lang="de-DE"/>
           </a:p>
@@ -593,7 +593,7 @@
           <a:p>
             <a:fld id="{647F39AA-F245-48BE-BB30-6F1FA3570527}" type="datetimeFigureOut">
               <a:rPr lang="de-DE" smtClean="0"/>
-              <a:t>06.06.19</a:t>
+              <a:t>14.06.19</a:t>
             </a:fld>
             <a:endParaRPr lang="de-DE"/>
           </a:p>
@@ -763,7 +763,7 @@
           <a:p>
             <a:fld id="{647F39AA-F245-48BE-BB30-6F1FA3570527}" type="datetimeFigureOut">
               <a:rPr lang="de-DE" smtClean="0"/>
-              <a:t>06.06.19</a:t>
+              <a:t>14.06.19</a:t>
             </a:fld>
             <a:endParaRPr lang="de-DE"/>
           </a:p>
@@ -1009,7 +1009,7 @@
           <a:p>
             <a:fld id="{647F39AA-F245-48BE-BB30-6F1FA3570527}" type="datetimeFigureOut">
               <a:rPr lang="de-DE" smtClean="0"/>
-              <a:t>06.06.19</a:t>
+              <a:t>14.06.19</a:t>
             </a:fld>
             <a:endParaRPr lang="de-DE"/>
           </a:p>
@@ -1241,7 +1241,7 @@
           <a:p>
             <a:fld id="{647F39AA-F245-48BE-BB30-6F1FA3570527}" type="datetimeFigureOut">
               <a:rPr lang="de-DE" smtClean="0"/>
-              <a:t>06.06.19</a:t>
+              <a:t>14.06.19</a:t>
             </a:fld>
             <a:endParaRPr lang="de-DE"/>
           </a:p>
@@ -1608,7 +1608,7 @@
           <a:p>
             <a:fld id="{647F39AA-F245-48BE-BB30-6F1FA3570527}" type="datetimeFigureOut">
               <a:rPr lang="de-DE" smtClean="0"/>
-              <a:t>06.06.19</a:t>
+              <a:t>14.06.19</a:t>
             </a:fld>
             <a:endParaRPr lang="de-DE"/>
           </a:p>
@@ -1726,7 +1726,7 @@
           <a:p>
             <a:fld id="{647F39AA-F245-48BE-BB30-6F1FA3570527}" type="datetimeFigureOut">
               <a:rPr lang="de-DE" smtClean="0"/>
-              <a:t>06.06.19</a:t>
+              <a:t>14.06.19</a:t>
             </a:fld>
             <a:endParaRPr lang="de-DE"/>
           </a:p>
@@ -1821,7 +1821,7 @@
           <a:p>
             <a:fld id="{647F39AA-F245-48BE-BB30-6F1FA3570527}" type="datetimeFigureOut">
               <a:rPr lang="de-DE" smtClean="0"/>
-              <a:t>06.06.19</a:t>
+              <a:t>14.06.19</a:t>
             </a:fld>
             <a:endParaRPr lang="de-DE"/>
           </a:p>
@@ -2098,7 +2098,7 @@
           <a:p>
             <a:fld id="{647F39AA-F245-48BE-BB30-6F1FA3570527}" type="datetimeFigureOut">
               <a:rPr lang="de-DE" smtClean="0"/>
-              <a:t>06.06.19</a:t>
+              <a:t>14.06.19</a:t>
             </a:fld>
             <a:endParaRPr lang="de-DE"/>
           </a:p>
@@ -2355,7 +2355,7 @@
           <a:p>
             <a:fld id="{647F39AA-F245-48BE-BB30-6F1FA3570527}" type="datetimeFigureOut">
               <a:rPr lang="de-DE" smtClean="0"/>
-              <a:t>06.06.19</a:t>
+              <a:t>14.06.19</a:t>
             </a:fld>
             <a:endParaRPr lang="de-DE"/>
           </a:p>
@@ -2568,7 +2568,7 @@
           <a:p>
             <a:fld id="{647F39AA-F245-48BE-BB30-6F1FA3570527}" type="datetimeFigureOut">
               <a:rPr lang="de-DE" smtClean="0"/>
-              <a:t>06.06.19</a:t>
+              <a:t>14.06.19</a:t>
             </a:fld>
             <a:endParaRPr lang="de-DE"/>
           </a:p>
@@ -3350,7 +3350,7 @@
                 </a:solidFill>
                 <a:latin typeface="DINOT" panose="020B0504020101020102" pitchFamily="34" charset="0"/>
               </a:rPr>
-              <a:t>you</a:t>
+              <a:t>your</a:t>
             </a:r>
             <a:r>
               <a:rPr lang="de-DE" sz="800" dirty="0" smtClean="0">
@@ -3747,7 +3747,7 @@
   <a:extraClrSchemeLst/>
   <a:extLst>
     <a:ext uri="{05A4C25C-085E-4340-85A3-A5531E510DB2}">
-      <thm15:themeFamily xmlns:thm15="http://schemas.microsoft.com/office/thememl/2012/main" xmlns="" name="Office Theme" id="{62F939B6-93AF-4DB8-9C6B-D6C7DFDC589F}" vid="{4A3C46E8-61CC-4603-A589-7422A47A8E4A}"/>
+      <thm15:themeFamily xmlns="" xmlns:thm15="http://schemas.microsoft.com/office/thememl/2012/main" name="Office Theme" id="{62F939B6-93AF-4DB8-9C6B-D6C7DFDC589F}" vid="{4A3C46E8-61CC-4603-A589-7422A47A8E4A}"/>
     </a:ext>
   </a:extLst>
 </a:theme>

</xml_diff>